<commit_message>
introduction added to chapter 6
</commit_message>
<xml_diff>
--- a/Chapter 6 - IR/notes/bevezeto/teszt_setup.pptx
+++ b/Chapter 6 - IR/notes/bevezeto/teszt_setup.pptx
@@ -104,6 +104,11 @@
       </a:defRPr>
     </a:lvl9pPr>
   </p:defaultTextStyle>
+  <p:extLst>
+    <p:ext uri="{EFAFB233-063F-42B5-8137-9DF3F51BA10A}">
+      <p15:sldGuideLst xmlns:p15="http://schemas.microsoft.com/office/powerpoint/2012/main"/>
+    </p:ext>
+  </p:extLst>
 </p:presentation>
 </file>
 
@@ -238,7 +243,7 @@
           <a:p>
             <a:fld id="{81EC5AC3-7E00-460F-A1EB-1460628083E8}" type="datetimeFigureOut">
               <a:rPr lang="en-US" smtClean="0"/>
-              <a:t>11/14/2021</a:t>
+              <a:t>11/18/2021</a:t>
             </a:fld>
             <a:endParaRPr lang="en-US"/>
           </a:p>
@@ -408,7 +413,7 @@
           <a:p>
             <a:fld id="{81EC5AC3-7E00-460F-A1EB-1460628083E8}" type="datetimeFigureOut">
               <a:rPr lang="en-US" smtClean="0"/>
-              <a:t>11/14/2021</a:t>
+              <a:t>11/18/2021</a:t>
             </a:fld>
             <a:endParaRPr lang="en-US"/>
           </a:p>
@@ -588,7 +593,7 @@
           <a:p>
             <a:fld id="{81EC5AC3-7E00-460F-A1EB-1460628083E8}" type="datetimeFigureOut">
               <a:rPr lang="en-US" smtClean="0"/>
-              <a:t>11/14/2021</a:t>
+              <a:t>11/18/2021</a:t>
             </a:fld>
             <a:endParaRPr lang="en-US"/>
           </a:p>
@@ -758,7 +763,7 @@
           <a:p>
             <a:fld id="{81EC5AC3-7E00-460F-A1EB-1460628083E8}" type="datetimeFigureOut">
               <a:rPr lang="en-US" smtClean="0"/>
-              <a:t>11/14/2021</a:t>
+              <a:t>11/18/2021</a:t>
             </a:fld>
             <a:endParaRPr lang="en-US"/>
           </a:p>
@@ -1004,7 +1009,7 @@
           <a:p>
             <a:fld id="{81EC5AC3-7E00-460F-A1EB-1460628083E8}" type="datetimeFigureOut">
               <a:rPr lang="en-US" smtClean="0"/>
-              <a:t>11/14/2021</a:t>
+              <a:t>11/18/2021</a:t>
             </a:fld>
             <a:endParaRPr lang="en-US"/>
           </a:p>
@@ -1236,7 +1241,7 @@
           <a:p>
             <a:fld id="{81EC5AC3-7E00-460F-A1EB-1460628083E8}" type="datetimeFigureOut">
               <a:rPr lang="en-US" smtClean="0"/>
-              <a:t>11/14/2021</a:t>
+              <a:t>11/18/2021</a:t>
             </a:fld>
             <a:endParaRPr lang="en-US"/>
           </a:p>
@@ -1603,7 +1608,7 @@
           <a:p>
             <a:fld id="{81EC5AC3-7E00-460F-A1EB-1460628083E8}" type="datetimeFigureOut">
               <a:rPr lang="en-US" smtClean="0"/>
-              <a:t>11/14/2021</a:t>
+              <a:t>11/18/2021</a:t>
             </a:fld>
             <a:endParaRPr lang="en-US"/>
           </a:p>
@@ -1721,7 +1726,7 @@
           <a:p>
             <a:fld id="{81EC5AC3-7E00-460F-A1EB-1460628083E8}" type="datetimeFigureOut">
               <a:rPr lang="en-US" smtClean="0"/>
-              <a:t>11/14/2021</a:t>
+              <a:t>11/18/2021</a:t>
             </a:fld>
             <a:endParaRPr lang="en-US"/>
           </a:p>
@@ -1816,7 +1821,7 @@
           <a:p>
             <a:fld id="{81EC5AC3-7E00-460F-A1EB-1460628083E8}" type="datetimeFigureOut">
               <a:rPr lang="en-US" smtClean="0"/>
-              <a:t>11/14/2021</a:t>
+              <a:t>11/18/2021</a:t>
             </a:fld>
             <a:endParaRPr lang="en-US"/>
           </a:p>
@@ -2093,7 +2098,7 @@
           <a:p>
             <a:fld id="{81EC5AC3-7E00-460F-A1EB-1460628083E8}" type="datetimeFigureOut">
               <a:rPr lang="en-US" smtClean="0"/>
-              <a:t>11/14/2021</a:t>
+              <a:t>11/18/2021</a:t>
             </a:fld>
             <a:endParaRPr lang="en-US"/>
           </a:p>
@@ -2346,7 +2351,7 @@
           <a:p>
             <a:fld id="{81EC5AC3-7E00-460F-A1EB-1460628083E8}" type="datetimeFigureOut">
               <a:rPr lang="en-US" smtClean="0"/>
-              <a:t>11/14/2021</a:t>
+              <a:t>11/18/2021</a:t>
             </a:fld>
             <a:endParaRPr lang="en-US"/>
           </a:p>
@@ -2559,7 +2564,7 @@
           <a:p>
             <a:fld id="{81EC5AC3-7E00-460F-A1EB-1460628083E8}" type="datetimeFigureOut">
               <a:rPr lang="en-US" smtClean="0"/>
-              <a:t>11/14/2021</a:t>
+              <a:t>11/18/2021</a:t>
             </a:fld>
             <a:endParaRPr lang="en-US"/>
           </a:p>
@@ -2966,7 +2971,7 @@
       </p:grpSpPr>
       <p:grpSp>
         <p:nvGrpSpPr>
-          <p:cNvPr id="36" name="Group 35"/>
+          <p:cNvPr id="37" name="Group 36"/>
           <p:cNvGrpSpPr/>
           <p:nvPr/>
         </p:nvGrpSpPr>
@@ -2974,27 +2979,27 @@
           <a:xfrm>
             <a:off x="1" y="0"/>
             <a:ext cx="12192000" cy="6857999"/>
-            <a:chOff x="1298448" y="1234439"/>
-            <a:chExt cx="9559248" cy="4032505"/>
+            <a:chOff x="1" y="0"/>
+            <a:chExt cx="12192000" cy="6857999"/>
           </a:xfrm>
         </p:grpSpPr>
         <p:grpSp>
           <p:nvGrpSpPr>
-            <p:cNvPr id="27" name="Group 26"/>
+            <p:cNvPr id="36" name="Group 35"/>
             <p:cNvGrpSpPr/>
             <p:nvPr/>
           </p:nvGrpSpPr>
           <p:grpSpPr>
             <a:xfrm>
-              <a:off x="1298448" y="1234439"/>
-              <a:ext cx="9559248" cy="4032505"/>
+              <a:off x="1" y="0"/>
+              <a:ext cx="12192000" cy="6857999"/>
               <a:chOff x="1298448" y="1234439"/>
               <a:chExt cx="9559248" cy="4032505"/>
             </a:xfrm>
           </p:grpSpPr>
           <p:grpSp>
             <p:nvGrpSpPr>
-              <p:cNvPr id="9" name="Group 8"/>
+              <p:cNvPr id="27" name="Group 26"/>
               <p:cNvGrpSpPr/>
               <p:nvPr/>
             </p:nvGrpSpPr>
@@ -3002,20 +3007,277 @@
               <a:xfrm>
                 <a:off x="1298448" y="1234439"/>
                 <a:ext cx="9559248" cy="4032505"/>
-                <a:chOff x="1463040" y="1051559"/>
+                <a:chOff x="1298448" y="1234439"/>
                 <a:chExt cx="9559248" cy="4032505"/>
               </a:xfrm>
             </p:grpSpPr>
+            <p:grpSp>
+              <p:nvGrpSpPr>
+                <p:cNvPr id="9" name="Group 8"/>
+                <p:cNvGrpSpPr/>
+                <p:nvPr/>
+              </p:nvGrpSpPr>
+              <p:grpSpPr>
+                <a:xfrm>
+                  <a:off x="1298448" y="1234439"/>
+                  <a:ext cx="9559248" cy="4032505"/>
+                  <a:chOff x="1463040" y="1051559"/>
+                  <a:chExt cx="9559248" cy="4032505"/>
+                </a:xfrm>
+              </p:grpSpPr>
+              <p:pic>
+                <p:nvPicPr>
+                  <p:cNvPr id="4" name="Picture 3"/>
+                  <p:cNvPicPr>
+                    <a:picLocks noChangeAspect="1"/>
+                  </p:cNvPicPr>
+                  <p:nvPr/>
+                </p:nvPicPr>
+                <p:blipFill>
+                  <a:blip r:embed="rId2">
+                    <a:extLst>
+                      <a:ext uri="{28A0092B-C50C-407E-A947-70E740481C1C}">
+                        <a14:useLocalDpi xmlns:a14="http://schemas.microsoft.com/office/drawing/2010/main" val="0"/>
+                      </a:ext>
+                    </a:extLst>
+                  </a:blip>
+                  <a:stretch>
+                    <a:fillRect/>
+                  </a:stretch>
+                </p:blipFill>
+                <p:spPr>
+                  <a:xfrm>
+                    <a:off x="1818143" y="1554480"/>
+                    <a:ext cx="9204145" cy="3396459"/>
+                  </a:xfrm>
+                  <a:prstGeom prst="rect">
+                    <a:avLst/>
+                  </a:prstGeom>
+                </p:spPr>
+              </p:pic>
+              <p:sp>
+                <p:nvSpPr>
+                  <p:cNvPr id="5" name="Rectangle 4"/>
+                  <p:cNvSpPr/>
+                  <p:nvPr/>
+                </p:nvSpPr>
+                <p:spPr>
+                  <a:xfrm flipH="1" flipV="1">
+                    <a:off x="1463040" y="1051559"/>
+                    <a:ext cx="1929384" cy="4032505"/>
+                  </a:xfrm>
+                  <a:prstGeom prst="rect">
+                    <a:avLst/>
+                  </a:prstGeom>
+                  <a:solidFill>
+                    <a:schemeClr val="bg1"/>
+                  </a:solidFill>
+                  <a:ln>
+                    <a:solidFill>
+                      <a:schemeClr val="bg1"/>
+                    </a:solidFill>
+                  </a:ln>
+                </p:spPr>
+                <p:style>
+                  <a:lnRef idx="2">
+                    <a:schemeClr val="accent1">
+                      <a:shade val="50000"/>
+                    </a:schemeClr>
+                  </a:lnRef>
+                  <a:fillRef idx="1">
+                    <a:schemeClr val="accent1"/>
+                  </a:fillRef>
+                  <a:effectRef idx="0">
+                    <a:schemeClr val="accent1"/>
+                  </a:effectRef>
+                  <a:fontRef idx="minor">
+                    <a:schemeClr val="lt1"/>
+                  </a:fontRef>
+                </p:style>
+                <p:txBody>
+                  <a:bodyPr rtlCol="0" anchor="ctr"/>
+                  <a:lstStyle/>
+                  <a:p>
+                    <a:pPr algn="ctr"/>
+                    <a:endParaRPr lang="en-US"/>
+                  </a:p>
+                </p:txBody>
+              </p:sp>
+              <p:sp>
+                <p:nvSpPr>
+                  <p:cNvPr id="6" name="Rectangle 5"/>
+                  <p:cNvSpPr/>
+                  <p:nvPr/>
+                </p:nvSpPr>
+                <p:spPr>
+                  <a:xfrm>
+                    <a:off x="4279392" y="1344168"/>
+                    <a:ext cx="1243584" cy="475488"/>
+                  </a:xfrm>
+                  <a:prstGeom prst="rect">
+                    <a:avLst/>
+                  </a:prstGeom>
+                  <a:solidFill>
+                    <a:schemeClr val="bg1"/>
+                  </a:solidFill>
+                  <a:ln>
+                    <a:solidFill>
+                      <a:schemeClr val="bg1"/>
+                    </a:solidFill>
+                  </a:ln>
+                </p:spPr>
+                <p:style>
+                  <a:lnRef idx="2">
+                    <a:schemeClr val="accent1">
+                      <a:shade val="50000"/>
+                    </a:schemeClr>
+                  </a:lnRef>
+                  <a:fillRef idx="1">
+                    <a:schemeClr val="accent1"/>
+                  </a:fillRef>
+                  <a:effectRef idx="0">
+                    <a:schemeClr val="accent1"/>
+                  </a:effectRef>
+                  <a:fontRef idx="minor">
+                    <a:schemeClr val="lt1"/>
+                  </a:fontRef>
+                </p:style>
+                <p:txBody>
+                  <a:bodyPr rtlCol="0" anchor="ctr"/>
+                  <a:lstStyle/>
+                  <a:p>
+                    <a:pPr algn="ctr"/>
+                    <a:r>
+                      <a:rPr lang="hu-HU" dirty="0" smtClean="0">
+                        <a:solidFill>
+                          <a:schemeClr val="tx1"/>
+                        </a:solidFill>
+                      </a:rPr>
+                      <a:t>R</a:t>
+                    </a:r>
+                    <a:r>
+                      <a:rPr lang="en-US" dirty="0" smtClean="0">
+                        <a:solidFill>
+                          <a:schemeClr val="tx1"/>
+                        </a:solidFill>
+                      </a:rPr>
+                      <a:t>1</a:t>
+                    </a:r>
+                    <a:endParaRPr lang="en-US" dirty="0">
+                      <a:solidFill>
+                        <a:schemeClr val="tx1"/>
+                      </a:solidFill>
+                    </a:endParaRPr>
+                  </a:p>
+                </p:txBody>
+              </p:sp>
+              <p:sp>
+                <p:nvSpPr>
+                  <p:cNvPr id="7" name="Rectangle 6"/>
+                  <p:cNvSpPr/>
+                  <p:nvPr/>
+                </p:nvSpPr>
+                <p:spPr>
+                  <a:xfrm>
+                    <a:off x="6585564" y="2852928"/>
+                    <a:ext cx="601620" cy="399781"/>
+                  </a:xfrm>
+                  <a:prstGeom prst="rect">
+                    <a:avLst/>
+                  </a:prstGeom>
+                  <a:solidFill>
+                    <a:schemeClr val="bg1"/>
+                  </a:solidFill>
+                  <a:ln>
+                    <a:solidFill>
+                      <a:schemeClr val="bg1"/>
+                    </a:solidFill>
+                  </a:ln>
+                </p:spPr>
+                <p:style>
+                  <a:lnRef idx="2">
+                    <a:schemeClr val="accent1">
+                      <a:shade val="50000"/>
+                    </a:schemeClr>
+                  </a:lnRef>
+                  <a:fillRef idx="1">
+                    <a:schemeClr val="accent1"/>
+                  </a:fillRef>
+                  <a:effectRef idx="0">
+                    <a:schemeClr val="accent1"/>
+                  </a:effectRef>
+                  <a:fontRef idx="minor">
+                    <a:schemeClr val="lt1"/>
+                  </a:fontRef>
+                </p:style>
+                <p:txBody>
+                  <a:bodyPr rtlCol="0" anchor="ctr"/>
+                  <a:lstStyle/>
+                  <a:p>
+                    <a:pPr algn="ctr"/>
+                    <a:endParaRPr lang="en-US"/>
+                  </a:p>
+                </p:txBody>
+              </p:sp>
+              <p:sp>
+                <p:nvSpPr>
+                  <p:cNvPr id="8" name="Rectangle 7"/>
+                  <p:cNvSpPr/>
+                  <p:nvPr/>
+                </p:nvSpPr>
+                <p:spPr>
+                  <a:xfrm>
+                    <a:off x="8302752" y="1819656"/>
+                    <a:ext cx="932688" cy="283464"/>
+                  </a:xfrm>
+                  <a:prstGeom prst="rect">
+                    <a:avLst/>
+                  </a:prstGeom>
+                  <a:solidFill>
+                    <a:schemeClr val="bg1"/>
+                  </a:solidFill>
+                  <a:ln>
+                    <a:solidFill>
+                      <a:schemeClr val="bg1"/>
+                    </a:solidFill>
+                  </a:ln>
+                </p:spPr>
+                <p:style>
+                  <a:lnRef idx="2">
+                    <a:schemeClr val="accent1">
+                      <a:shade val="50000"/>
+                    </a:schemeClr>
+                  </a:lnRef>
+                  <a:fillRef idx="1">
+                    <a:schemeClr val="accent1"/>
+                  </a:fillRef>
+                  <a:effectRef idx="0">
+                    <a:schemeClr val="accent1"/>
+                  </a:effectRef>
+                  <a:fontRef idx="minor">
+                    <a:schemeClr val="lt1"/>
+                  </a:fontRef>
+                </p:style>
+                <p:txBody>
+                  <a:bodyPr rtlCol="0" anchor="ctr"/>
+                  <a:lstStyle/>
+                  <a:p>
+                    <a:pPr algn="ctr"/>
+                    <a:endParaRPr lang="en-US"/>
+                  </a:p>
+                </p:txBody>
+              </p:sp>
+            </p:grpSp>
             <p:pic>
               <p:nvPicPr>
-                <p:cNvPr id="4" name="Picture 3"/>
+                <p:cNvPr id="10" name="Picture 9"/>
                 <p:cNvPicPr>
                   <a:picLocks noChangeAspect="1"/>
                 </p:cNvPicPr>
                 <p:nvPr/>
               </p:nvPicPr>
               <p:blipFill>
-                <a:blip r:embed="rId2">
+                <a:blip r:embed="rId3" cstate="print">
                   <a:extLst>
                     <a:ext uri="{28A0092B-C50C-407E-A947-70E740481C1C}">
                       <a14:useLocalDpi xmlns:a14="http://schemas.microsoft.com/office/drawing/2010/main" val="0"/>
@@ -3027,276 +3289,206 @@
                 </a:stretch>
               </p:blipFill>
               <p:spPr>
-                <a:xfrm>
-                  <a:off x="1818143" y="1554480"/>
-                  <a:ext cx="9204145" cy="3396459"/>
+                <a:xfrm rot="16200000">
+                  <a:off x="1513632" y="3708382"/>
+                  <a:ext cx="2295144" cy="796128"/>
                 </a:xfrm>
                 <a:prstGeom prst="rect">
                   <a:avLst/>
                 </a:prstGeom>
               </p:spPr>
             </p:pic>
-            <p:sp>
-              <p:nvSpPr>
-                <p:cNvPr id="5" name="Rectangle 4"/>
-                <p:cNvSpPr/>
+            <p:cxnSp>
+              <p:nvCxnSpPr>
+                <p:cNvPr id="12" name="Straight Connector 11"/>
+                <p:cNvCxnSpPr/>
                 <p:nvPr/>
-              </p:nvSpPr>
+              </p:nvCxnSpPr>
               <p:spPr>
-                <a:xfrm flipH="1" flipV="1">
-                  <a:off x="1463040" y="1051559"/>
-                  <a:ext cx="1929384" cy="4032505"/>
+                <a:xfrm flipH="1">
+                  <a:off x="2702118" y="3311127"/>
+                  <a:ext cx="541481" cy="0"/>
                 </a:xfrm>
-                <a:prstGeom prst="rect">
+                <a:prstGeom prst="line">
                   <a:avLst/>
                 </a:prstGeom>
-                <a:solidFill>
-                  <a:schemeClr val="bg1"/>
-                </a:solidFill>
-                <a:ln>
+                <a:ln w="38100">
                   <a:solidFill>
-                    <a:schemeClr val="bg1"/>
+                    <a:schemeClr val="tx1"/>
                   </a:solidFill>
                 </a:ln>
               </p:spPr>
               <p:style>
-                <a:lnRef idx="2">
-                  <a:schemeClr val="accent1">
-                    <a:shade val="50000"/>
-                  </a:schemeClr>
+                <a:lnRef idx="1">
+                  <a:schemeClr val="accent1"/>
                 </a:lnRef>
-                <a:fillRef idx="1">
+                <a:fillRef idx="0">
                   <a:schemeClr val="accent1"/>
                 </a:fillRef>
                 <a:effectRef idx="0">
                   <a:schemeClr val="accent1"/>
                 </a:effectRef>
                 <a:fontRef idx="minor">
-                  <a:schemeClr val="lt1"/>
+                  <a:schemeClr val="tx1"/>
                 </a:fontRef>
               </p:style>
-              <p:txBody>
-                <a:bodyPr rtlCol="0" anchor="ctr"/>
-                <a:lstStyle/>
-                <a:p>
-                  <a:pPr algn="ctr"/>
-                  <a:endParaRPr lang="en-US"/>
-                </a:p>
-              </p:txBody>
-            </p:sp>
-            <p:sp>
-              <p:nvSpPr>
-                <p:cNvPr id="6" name="Rectangle 5"/>
-                <p:cNvSpPr/>
+            </p:cxnSp>
+            <p:cxnSp>
+              <p:nvCxnSpPr>
+                <p:cNvPr id="14" name="Straight Connector 13"/>
+                <p:cNvCxnSpPr/>
                 <p:nvPr/>
-              </p:nvSpPr>
+              </p:nvCxnSpPr>
               <p:spPr>
-                <a:xfrm>
-                  <a:off x="4279392" y="1344168"/>
-                  <a:ext cx="1243584" cy="475488"/>
+                <a:xfrm flipH="1">
+                  <a:off x="2489489" y="4912285"/>
+                  <a:ext cx="425258" cy="297"/>
                 </a:xfrm>
-                <a:prstGeom prst="rect">
+                <a:prstGeom prst="line">
                   <a:avLst/>
                 </a:prstGeom>
-                <a:solidFill>
-                  <a:schemeClr val="bg1"/>
-                </a:solidFill>
-                <a:ln>
+                <a:ln w="38100">
                   <a:solidFill>
-                    <a:schemeClr val="bg1"/>
+                    <a:schemeClr val="tx1"/>
                   </a:solidFill>
                 </a:ln>
               </p:spPr>
               <p:style>
-                <a:lnRef idx="2">
-                  <a:schemeClr val="accent1">
-                    <a:shade val="50000"/>
-                  </a:schemeClr>
+                <a:lnRef idx="1">
+                  <a:schemeClr val="accent1"/>
                 </a:lnRef>
-                <a:fillRef idx="1">
+                <a:fillRef idx="0">
                   <a:schemeClr val="accent1"/>
                 </a:fillRef>
                 <a:effectRef idx="0">
                   <a:schemeClr val="accent1"/>
                 </a:effectRef>
                 <a:fontRef idx="minor">
-                  <a:schemeClr val="lt1"/>
+                  <a:schemeClr val="tx1"/>
                 </a:fontRef>
               </p:style>
-              <p:txBody>
-                <a:bodyPr rtlCol="0" anchor="ctr"/>
-                <a:lstStyle/>
-                <a:p>
-                  <a:pPr algn="ctr"/>
-                  <a:r>
-                    <a:rPr lang="hu-HU" dirty="0" smtClean="0">
-                      <a:solidFill>
-                        <a:schemeClr val="tx1"/>
-                      </a:solidFill>
-                    </a:rPr>
-                    <a:t>R</a:t>
-                  </a:r>
-                  <a:r>
-                    <a:rPr lang="en-US" dirty="0" smtClean="0">
-                      <a:solidFill>
-                        <a:schemeClr val="tx1"/>
-                      </a:solidFill>
-                    </a:rPr>
-                    <a:t>1</a:t>
-                  </a:r>
-                  <a:endParaRPr lang="en-US" dirty="0">
-                    <a:solidFill>
-                      <a:schemeClr val="tx1"/>
-                    </a:solidFill>
-                  </a:endParaRPr>
-                </a:p>
-              </p:txBody>
-            </p:sp>
-            <p:sp>
-              <p:nvSpPr>
-                <p:cNvPr id="7" name="Rectangle 6"/>
-                <p:cNvSpPr/>
+            </p:cxnSp>
+            <p:cxnSp>
+              <p:nvCxnSpPr>
+                <p:cNvPr id="16" name="Straight Connector 15"/>
+                <p:cNvCxnSpPr/>
                 <p:nvPr/>
-              </p:nvSpPr>
+              </p:nvCxnSpPr>
               <p:spPr>
-                <a:xfrm>
-                  <a:off x="6585564" y="2852928"/>
-                  <a:ext cx="601620" cy="399781"/>
+                <a:xfrm flipH="1" flipV="1">
+                  <a:off x="2581672" y="4989257"/>
+                  <a:ext cx="247153" cy="7146"/>
                 </a:xfrm>
-                <a:prstGeom prst="rect">
+                <a:prstGeom prst="line">
                   <a:avLst/>
                 </a:prstGeom>
-                <a:solidFill>
-                  <a:schemeClr val="bg1"/>
-                </a:solidFill>
-                <a:ln>
+                <a:ln w="38100">
                   <a:solidFill>
-                    <a:schemeClr val="bg1"/>
+                    <a:schemeClr val="tx1"/>
                   </a:solidFill>
                 </a:ln>
               </p:spPr>
               <p:style>
-                <a:lnRef idx="2">
-                  <a:schemeClr val="accent1">
-                    <a:shade val="50000"/>
-                  </a:schemeClr>
+                <a:lnRef idx="1">
+                  <a:schemeClr val="accent1"/>
                 </a:lnRef>
-                <a:fillRef idx="1">
+                <a:fillRef idx="0">
                   <a:schemeClr val="accent1"/>
                 </a:fillRef>
                 <a:effectRef idx="0">
                   <a:schemeClr val="accent1"/>
                 </a:effectRef>
                 <a:fontRef idx="minor">
-                  <a:schemeClr val="lt1"/>
+                  <a:schemeClr val="tx1"/>
                 </a:fontRef>
               </p:style>
-              <p:txBody>
-                <a:bodyPr rtlCol="0" anchor="ctr"/>
-                <a:lstStyle/>
-                <a:p>
-                  <a:pPr algn="ctr"/>
-                  <a:endParaRPr lang="en-US"/>
-                </a:p>
-              </p:txBody>
-            </p:sp>
-            <p:sp>
-              <p:nvSpPr>
-                <p:cNvPr id="8" name="Rectangle 7"/>
-                <p:cNvSpPr/>
+            </p:cxnSp>
+            <p:cxnSp>
+              <p:nvCxnSpPr>
+                <p:cNvPr id="22" name="Straight Connector 21"/>
+                <p:cNvCxnSpPr/>
                 <p:nvPr/>
-              </p:nvSpPr>
+              </p:nvCxnSpPr>
               <p:spPr>
-                <a:xfrm>
-                  <a:off x="8302752" y="1819656"/>
-                  <a:ext cx="932688" cy="283464"/>
+                <a:xfrm flipH="1">
+                  <a:off x="2651366" y="5061648"/>
+                  <a:ext cx="107744" cy="2635"/>
                 </a:xfrm>
-                <a:prstGeom prst="rect">
+                <a:prstGeom prst="line">
                   <a:avLst/>
                 </a:prstGeom>
-                <a:solidFill>
-                  <a:schemeClr val="bg1"/>
-                </a:solidFill>
-                <a:ln>
+                <a:ln w="38100">
                   <a:solidFill>
-                    <a:schemeClr val="bg1"/>
+                    <a:schemeClr val="tx1"/>
                   </a:solidFill>
                 </a:ln>
               </p:spPr>
               <p:style>
-                <a:lnRef idx="2">
-                  <a:schemeClr val="accent1">
-                    <a:shade val="50000"/>
-                  </a:schemeClr>
+                <a:lnRef idx="1">
+                  <a:schemeClr val="accent1"/>
                 </a:lnRef>
-                <a:fillRef idx="1">
+                <a:fillRef idx="0">
                   <a:schemeClr val="accent1"/>
                 </a:fillRef>
                 <a:effectRef idx="0">
                   <a:schemeClr val="accent1"/>
                 </a:effectRef>
                 <a:fontRef idx="minor">
-                  <a:schemeClr val="lt1"/>
+                  <a:schemeClr val="tx1"/>
                 </a:fontRef>
               </p:style>
-              <p:txBody>
-                <a:bodyPr rtlCol="0" anchor="ctr"/>
-                <a:lstStyle/>
-                <a:p>
-                  <a:pPr algn="ctr"/>
-                  <a:endParaRPr lang="en-US"/>
-                </a:p>
-              </p:txBody>
-            </p:sp>
+            </p:cxnSp>
           </p:grpSp>
-          <p:pic>
-            <p:nvPicPr>
-              <p:cNvPr id="10" name="Picture 9"/>
-              <p:cNvPicPr>
-                <a:picLocks noChangeAspect="1"/>
-              </p:cNvPicPr>
+          <p:sp>
+            <p:nvSpPr>
+              <p:cNvPr id="29" name="TextBox 28"/>
+              <p:cNvSpPr txBox="1"/>
               <p:nvPr/>
-            </p:nvPicPr>
-            <p:blipFill>
-              <a:blip r:embed="rId3" cstate="print">
-                <a:extLst>
-                  <a:ext uri="{28A0092B-C50C-407E-A947-70E740481C1C}">
-                    <a14:useLocalDpi xmlns:a14="http://schemas.microsoft.com/office/drawing/2010/main" val="0"/>
-                  </a:ext>
-                </a:extLst>
-              </a:blip>
-              <a:stretch>
-                <a:fillRect/>
-              </a:stretch>
-            </p:blipFill>
+            </p:nvSpPr>
             <p:spPr>
-              <a:xfrm rot="16200000">
-                <a:off x="1513632" y="3708382"/>
-                <a:ext cx="2295144" cy="796128"/>
+              <a:xfrm>
+                <a:off x="8343484" y="2101334"/>
+                <a:ext cx="727364" cy="369332"/>
               </a:xfrm>
               <a:prstGeom prst="rect">
                 <a:avLst/>
               </a:prstGeom>
+              <a:noFill/>
             </p:spPr>
-          </p:pic>
+            <p:txBody>
+              <a:bodyPr wrap="square" rtlCol="0">
+                <a:spAutoFit/>
+              </a:bodyPr>
+              <a:lstStyle/>
+              <a:p>
+                <a:r>
+                  <a:rPr lang="en-US" dirty="0" smtClean="0"/>
+                  <a:t>R3</a:t>
+                </a:r>
+                <a:endParaRPr lang="en-US" dirty="0"/>
+              </a:p>
+            </p:txBody>
+          </p:sp>
           <p:cxnSp>
             <p:nvCxnSpPr>
-              <p:cNvPr id="12" name="Straight Connector 11"/>
+              <p:cNvPr id="31" name="Elbow Connector 30"/>
               <p:cNvCxnSpPr/>
               <p:nvPr/>
             </p:nvCxnSpPr>
             <p:spPr>
-              <a:xfrm flipH="1">
-                <a:off x="2702118" y="3311127"/>
-                <a:ext cx="541481" cy="0"/>
+              <a:xfrm rot="5400000" flipH="1" flipV="1">
+                <a:off x="2438172" y="2729118"/>
+                <a:ext cx="952090" cy="849456"/>
               </a:xfrm>
-              <a:prstGeom prst="line">
+              <a:prstGeom prst="bentConnector3">
                 <a:avLst/>
               </a:prstGeom>
-              <a:ln w="38100">
+              <a:ln w="12700">
                 <a:solidFill>
                   <a:schemeClr val="tx1"/>
                 </a:solidFill>
+                <a:headEnd type="triangle"/>
+                <a:tailEnd type="none"/>
               </a:ln>
             </p:spPr>
             <p:style>
@@ -3314,263 +3506,139 @@
               </a:fontRef>
             </p:style>
           </p:cxnSp>
-          <p:cxnSp>
-            <p:nvCxnSpPr>
-              <p:cNvPr id="14" name="Straight Connector 13"/>
-              <p:cNvCxnSpPr/>
+          <p:sp>
+            <p:nvSpPr>
+              <p:cNvPr id="33" name="TextBox 32"/>
+              <p:cNvSpPr txBox="1"/>
               <p:nvPr/>
-            </p:nvCxnSpPr>
+            </p:nvSpPr>
             <p:spPr>
-              <a:xfrm flipH="1">
-                <a:off x="2489489" y="4912285"/>
-                <a:ext cx="425258" cy="297"/>
+              <a:xfrm>
+                <a:off x="2374392" y="2757025"/>
+                <a:ext cx="402674" cy="369332"/>
               </a:xfrm>
-              <a:prstGeom prst="line">
+              <a:prstGeom prst="rect">
                 <a:avLst/>
               </a:prstGeom>
-              <a:ln w="38100">
+              <a:noFill/>
+            </p:spPr>
+            <p:txBody>
+              <a:bodyPr wrap="none" rtlCol="0">
+                <a:spAutoFit/>
+              </a:bodyPr>
+              <a:lstStyle/>
+              <a:p>
+                <a:r>
+                  <a:rPr lang="en-US" dirty="0" err="1" smtClean="0"/>
+                  <a:t>I</a:t>
+                </a:r>
+                <a:r>
+                  <a:rPr lang="en-US" baseline="-25000" dirty="0" err="1" smtClean="0"/>
+                  <a:t>pd</a:t>
+                </a:r>
+                <a:endParaRPr lang="en-US" dirty="0"/>
+              </a:p>
+            </p:txBody>
+          </p:sp>
+          <p:sp>
+            <p:nvSpPr>
+              <p:cNvPr id="34" name="Oval 33"/>
+              <p:cNvSpPr/>
+              <p:nvPr/>
+            </p:nvSpPr>
+            <p:spPr>
+              <a:xfrm>
+                <a:off x="6053735" y="3495689"/>
+                <a:ext cx="138546" cy="138546"/>
+              </a:xfrm>
+              <a:prstGeom prst="ellipse">
+                <a:avLst/>
+              </a:prstGeom>
+              <a:solidFill>
+                <a:schemeClr val="tx1"/>
+              </a:solidFill>
+              <a:ln>
                 <a:solidFill>
                   <a:schemeClr val="tx1"/>
                 </a:solidFill>
               </a:ln>
             </p:spPr>
             <p:style>
-              <a:lnRef idx="1">
-                <a:schemeClr val="accent1"/>
+              <a:lnRef idx="2">
+                <a:schemeClr val="accent1">
+                  <a:shade val="50000"/>
+                </a:schemeClr>
               </a:lnRef>
-              <a:fillRef idx="0">
+              <a:fillRef idx="1">
                 <a:schemeClr val="accent1"/>
               </a:fillRef>
               <a:effectRef idx="0">
                 <a:schemeClr val="accent1"/>
               </a:effectRef>
               <a:fontRef idx="minor">
-                <a:schemeClr val="tx1"/>
+                <a:schemeClr val="lt1"/>
               </a:fontRef>
             </p:style>
-          </p:cxnSp>
-          <p:cxnSp>
-            <p:nvCxnSpPr>
-              <p:cNvPr id="16" name="Straight Connector 15"/>
-              <p:cNvCxnSpPr/>
+            <p:txBody>
+              <a:bodyPr rtlCol="0" anchor="ctr"/>
+              <a:lstStyle/>
+              <a:p>
+                <a:pPr algn="ctr"/>
+                <a:endParaRPr lang="en-US"/>
+              </a:p>
+            </p:txBody>
+          </p:sp>
+          <p:sp>
+            <p:nvSpPr>
+              <p:cNvPr id="35" name="TextBox 34"/>
+              <p:cNvSpPr txBox="1"/>
               <p:nvPr/>
-            </p:nvCxnSpPr>
+            </p:nvSpPr>
             <p:spPr>
-              <a:xfrm flipH="1" flipV="1">
-                <a:off x="2581672" y="4989257"/>
-                <a:ext cx="247153" cy="7146"/>
+              <a:xfrm>
+                <a:off x="5906441" y="3659881"/>
+                <a:ext cx="433132" cy="369332"/>
               </a:xfrm>
-              <a:prstGeom prst="line">
+              <a:prstGeom prst="rect">
                 <a:avLst/>
               </a:prstGeom>
-              <a:ln w="38100">
-                <a:solidFill>
-                  <a:schemeClr val="tx1"/>
-                </a:solidFill>
-              </a:ln>
+              <a:noFill/>
             </p:spPr>
-            <p:style>
-              <a:lnRef idx="1">
-                <a:schemeClr val="accent1"/>
-              </a:lnRef>
-              <a:fillRef idx="0">
-                <a:schemeClr val="accent1"/>
-              </a:fillRef>
-              <a:effectRef idx="0">
-                <a:schemeClr val="accent1"/>
-              </a:effectRef>
-              <a:fontRef idx="minor">
-                <a:schemeClr val="tx1"/>
-              </a:fontRef>
-            </p:style>
-          </p:cxnSp>
-          <p:cxnSp>
-            <p:nvCxnSpPr>
-              <p:cNvPr id="22" name="Straight Connector 21"/>
-              <p:cNvCxnSpPr/>
-              <p:nvPr/>
-            </p:nvCxnSpPr>
-            <p:spPr>
-              <a:xfrm flipH="1">
-                <a:off x="2651366" y="5061648"/>
-                <a:ext cx="107744" cy="2635"/>
-              </a:xfrm>
-              <a:prstGeom prst="line">
-                <a:avLst/>
-              </a:prstGeom>
-              <a:ln w="38100">
-                <a:solidFill>
-                  <a:schemeClr val="tx1"/>
-                </a:solidFill>
-              </a:ln>
-            </p:spPr>
-            <p:style>
-              <a:lnRef idx="1">
-                <a:schemeClr val="accent1"/>
-              </a:lnRef>
-              <a:fillRef idx="0">
-                <a:schemeClr val="accent1"/>
-              </a:fillRef>
-              <a:effectRef idx="0">
-                <a:schemeClr val="accent1"/>
-              </a:effectRef>
-              <a:fontRef idx="minor">
-                <a:schemeClr val="tx1"/>
-              </a:fontRef>
-            </p:style>
-          </p:cxnSp>
+            <p:txBody>
+              <a:bodyPr wrap="none" rtlCol="0">
+                <a:spAutoFit/>
+              </a:bodyPr>
+              <a:lstStyle/>
+              <a:p>
+                <a:r>
+                  <a:rPr lang="en-US" dirty="0" smtClean="0"/>
+                  <a:t>V1</a:t>
+                </a:r>
+                <a:endParaRPr lang="en-US" dirty="0"/>
+              </a:p>
+            </p:txBody>
+          </p:sp>
         </p:grpSp>
         <p:sp>
           <p:nvSpPr>
-            <p:cNvPr id="28" name="TextBox 27"/>
-            <p:cNvSpPr txBox="1"/>
-            <p:nvPr/>
-          </p:nvSpPr>
-          <p:spPr>
-            <a:xfrm>
-              <a:off x="6402684" y="3126357"/>
-              <a:ext cx="426720" cy="369332"/>
-            </a:xfrm>
-            <a:prstGeom prst="rect">
-              <a:avLst/>
-            </a:prstGeom>
-            <a:noFill/>
-          </p:spPr>
-          <p:txBody>
-            <a:bodyPr wrap="none" rtlCol="0">
-              <a:spAutoFit/>
-            </a:bodyPr>
-            <a:lstStyle/>
-            <a:p>
-              <a:r>
-                <a:rPr lang="en-US" dirty="0" smtClean="0"/>
-                <a:t>R2</a:t>
-              </a:r>
-              <a:endParaRPr lang="en-US" dirty="0"/>
-            </a:p>
-          </p:txBody>
-        </p:sp>
-        <p:sp>
-          <p:nvSpPr>
-            <p:cNvPr id="29" name="TextBox 28"/>
-            <p:cNvSpPr txBox="1"/>
-            <p:nvPr/>
-          </p:nvSpPr>
-          <p:spPr>
-            <a:xfrm>
-              <a:off x="8240822" y="1959602"/>
-              <a:ext cx="727364" cy="369332"/>
-            </a:xfrm>
-            <a:prstGeom prst="rect">
-              <a:avLst/>
-            </a:prstGeom>
-            <a:noFill/>
-          </p:spPr>
-          <p:txBody>
-            <a:bodyPr wrap="square" rtlCol="0">
-              <a:spAutoFit/>
-            </a:bodyPr>
-            <a:lstStyle/>
-            <a:p>
-              <a:r>
-                <a:rPr lang="en-US" dirty="0" smtClean="0"/>
-                <a:t>R3</a:t>
-              </a:r>
-              <a:endParaRPr lang="en-US" dirty="0"/>
-            </a:p>
-          </p:txBody>
-        </p:sp>
-        <p:cxnSp>
-          <p:nvCxnSpPr>
-            <p:cNvPr id="31" name="Elbow Connector 30"/>
-            <p:cNvCxnSpPr/>
-            <p:nvPr/>
-          </p:nvCxnSpPr>
-          <p:spPr>
-            <a:xfrm rot="5400000" flipH="1" flipV="1">
-              <a:off x="2438172" y="2729118"/>
-              <a:ext cx="952090" cy="849456"/>
-            </a:xfrm>
-            <a:prstGeom prst="bentConnector3">
-              <a:avLst/>
-            </a:prstGeom>
-            <a:ln w="12700">
-              <a:solidFill>
-                <a:schemeClr val="tx1"/>
-              </a:solidFill>
-              <a:headEnd type="triangle"/>
-              <a:tailEnd type="none"/>
-            </a:ln>
-          </p:spPr>
-          <p:style>
-            <a:lnRef idx="1">
-              <a:schemeClr val="accent1"/>
-            </a:lnRef>
-            <a:fillRef idx="0">
-              <a:schemeClr val="accent1"/>
-            </a:fillRef>
-            <a:effectRef idx="0">
-              <a:schemeClr val="accent1"/>
-            </a:effectRef>
-            <a:fontRef idx="minor">
-              <a:schemeClr val="tx1"/>
-            </a:fontRef>
-          </p:style>
-        </p:cxnSp>
-        <p:sp>
-          <p:nvSpPr>
-            <p:cNvPr id="33" name="TextBox 32"/>
-            <p:cNvSpPr txBox="1"/>
-            <p:nvPr/>
-          </p:nvSpPr>
-          <p:spPr>
-            <a:xfrm>
-              <a:off x="2374392" y="2757025"/>
-              <a:ext cx="402674" cy="369332"/>
-            </a:xfrm>
-            <a:prstGeom prst="rect">
-              <a:avLst/>
-            </a:prstGeom>
-            <a:noFill/>
-          </p:spPr>
-          <p:txBody>
-            <a:bodyPr wrap="none" rtlCol="0">
-              <a:spAutoFit/>
-            </a:bodyPr>
-            <a:lstStyle/>
-            <a:p>
-              <a:r>
-                <a:rPr lang="en-US" dirty="0" err="1" smtClean="0"/>
-                <a:t>I</a:t>
-              </a:r>
-              <a:r>
-                <a:rPr lang="en-US" baseline="-25000" dirty="0" err="1" smtClean="0"/>
-                <a:t>pd</a:t>
-              </a:r>
-              <a:endParaRPr lang="en-US" dirty="0"/>
-            </a:p>
-          </p:txBody>
-        </p:sp>
-        <p:sp>
-          <p:nvSpPr>
-            <p:cNvPr id="34" name="Oval 33"/>
+            <p:cNvPr id="3" name="Rectangle 2"/>
             <p:cNvSpPr/>
             <p:nvPr/>
           </p:nvSpPr>
           <p:spPr>
             <a:xfrm>
-              <a:off x="6053735" y="3495689"/>
-              <a:ext cx="138546" cy="138546"/>
+              <a:off x="6429524" y="3787066"/>
+              <a:ext cx="671502" cy="2403421"/>
             </a:xfrm>
-            <a:prstGeom prst="ellipse">
+            <a:prstGeom prst="rect">
               <a:avLst/>
             </a:prstGeom>
             <a:solidFill>
-              <a:schemeClr val="tx1"/>
+              <a:schemeClr val="bg1"/>
             </a:solidFill>
             <a:ln>
               <a:solidFill>
-                <a:schemeClr val="tx1"/>
+                <a:schemeClr val="bg1"/>
               </a:solidFill>
             </a:ln>
           </p:spPr>
@@ -3601,14 +3669,149 @@
         </p:sp>
         <p:sp>
           <p:nvSpPr>
-            <p:cNvPr id="35" name="TextBox 34"/>
+            <p:cNvPr id="26" name="Rectangle 25"/>
+            <p:cNvSpPr/>
+            <p:nvPr/>
+          </p:nvSpPr>
+          <p:spPr>
+            <a:xfrm>
+              <a:off x="7101026" y="4617181"/>
+              <a:ext cx="790246" cy="1744129"/>
+            </a:xfrm>
+            <a:prstGeom prst="rect">
+              <a:avLst/>
+            </a:prstGeom>
+            <a:solidFill>
+              <a:schemeClr val="bg1"/>
+            </a:solidFill>
+            <a:ln>
+              <a:solidFill>
+                <a:schemeClr val="bg1"/>
+              </a:solidFill>
+            </a:ln>
+          </p:spPr>
+          <p:style>
+            <a:lnRef idx="2">
+              <a:schemeClr val="accent1">
+                <a:shade val="50000"/>
+              </a:schemeClr>
+            </a:lnRef>
+            <a:fillRef idx="1">
+              <a:schemeClr val="accent1"/>
+            </a:fillRef>
+            <a:effectRef idx="0">
+              <a:schemeClr val="accent1"/>
+            </a:effectRef>
+            <a:fontRef idx="minor">
+              <a:schemeClr val="lt1"/>
+            </a:fontRef>
+          </p:style>
+          <p:txBody>
+            <a:bodyPr rtlCol="0" anchor="ctr"/>
+            <a:lstStyle/>
+            <a:p>
+              <a:pPr algn="ctr"/>
+              <a:endParaRPr lang="en-US"/>
+            </a:p>
+          </p:txBody>
+        </p:sp>
+        <p:cxnSp>
+          <p:nvCxnSpPr>
+            <p:cNvPr id="18" name="Elbow Connector 17"/>
+            <p:cNvCxnSpPr/>
+            <p:nvPr/>
+          </p:nvCxnSpPr>
+          <p:spPr>
+            <a:xfrm rot="10800000">
+              <a:off x="6349884" y="3994666"/>
+              <a:ext cx="1649706" cy="792821"/>
+            </a:xfrm>
+            <a:prstGeom prst="bentConnector3">
+              <a:avLst>
+                <a:gd name="adj1" fmla="val 93788"/>
+              </a:avLst>
+            </a:prstGeom>
+            <a:ln w="76200">
+              <a:solidFill>
+                <a:schemeClr val="tx1"/>
+              </a:solidFill>
+              <a:headEnd type="none" w="med" len="med"/>
+              <a:tailEnd type="none" w="med" len="med"/>
+            </a:ln>
+          </p:spPr>
+          <p:style>
+            <a:lnRef idx="1">
+              <a:schemeClr val="accent1"/>
+            </a:lnRef>
+            <a:fillRef idx="0">
+              <a:schemeClr val="accent1"/>
+            </a:fillRef>
+            <a:effectRef idx="0">
+              <a:schemeClr val="accent1"/>
+            </a:effectRef>
+            <a:fontRef idx="minor">
+              <a:schemeClr val="tx1"/>
+            </a:fontRef>
+          </p:style>
+        </p:cxnSp>
+        <p:pic>
+          <p:nvPicPr>
+            <p:cNvPr id="30" name="Picture 29"/>
+            <p:cNvPicPr>
+              <a:picLocks noChangeAspect="1"/>
+            </p:cNvPicPr>
+            <p:nvPr/>
+          </p:nvPicPr>
+          <p:blipFill>
+            <a:blip r:embed="rId4"/>
+            <a:stretch>
+              <a:fillRect/>
+            </a:stretch>
+          </p:blipFill>
+          <p:spPr>
+            <a:xfrm rot="10800000">
+              <a:off x="6779234" y="1360485"/>
+              <a:ext cx="791003" cy="1247775"/>
+            </a:xfrm>
+            <a:prstGeom prst="rect">
+              <a:avLst/>
+            </a:prstGeom>
+          </p:spPr>
+        </p:pic>
+        <p:pic>
+          <p:nvPicPr>
+            <p:cNvPr id="2" name="Picture 1"/>
+            <p:cNvPicPr>
+              <a:picLocks noChangeAspect="1"/>
+            </p:cNvPicPr>
+            <p:nvPr/>
+          </p:nvPicPr>
+          <p:blipFill>
+            <a:blip r:embed="rId5"/>
+            <a:stretch>
+              <a:fillRect/>
+            </a:stretch>
+          </p:blipFill>
+          <p:spPr>
+            <a:xfrm rot="16200000">
+              <a:off x="6502697" y="2952921"/>
+              <a:ext cx="1381125" cy="695325"/>
+            </a:xfrm>
+            <a:prstGeom prst="rect">
+              <a:avLst/>
+            </a:prstGeom>
+          </p:spPr>
+        </p:pic>
+        <p:sp>
+          <p:nvSpPr>
+            <p:cNvPr id="32" name="TextBox 31"/>
             <p:cNvSpPr txBox="1"/>
             <p:nvPr/>
           </p:nvSpPr>
           <p:spPr>
             <a:xfrm>
-              <a:off x="5906442" y="3564962"/>
-              <a:ext cx="433132" cy="369332"/>
+              <a:off x="6602922" y="3197681"/>
+              <a:ext cx="426720" cy="369332"/>
             </a:xfrm>
             <a:prstGeom prst="rect">
               <a:avLst/>
@@ -3622,8 +3825,8 @@
             <a:lstStyle/>
             <a:p>
               <a:r>
-                <a:rPr lang="en-US" dirty="0" smtClean="0"/>
-                <a:t>V1</a:t>
+                <a:rPr lang="hu-HU" dirty="0" smtClean="0"/>
+                <a:t>R2</a:t>
               </a:r>
               <a:endParaRPr lang="en-US" dirty="0"/>
             </a:p>

</xml_diff>